<commit_message>
Proofread and edit final draft of iPython notebook for final project for EDX UCSD Python for Data Science, continue on with Wk 5 Coursera Stanford ML
</commit_message>
<xml_diff>
--- a/Python/UCSD/PythonForDataScience/Week9/DSE_200X_FinalProjectPresentation.pptx
+++ b/Python/UCSD/PythonForDataScience/Week9/DSE_200X_FinalProjectPresentation.pptx
@@ -226,6 +226,11 @@
       </a:defRPr>
     </a:lvl9pPr>
   </p:defaultTextStyle>
+  <p:extLst>
+    <p:ext uri="{EFAFB233-063F-42B5-8137-9DF3F51BA10A}">
+      <p15:sldGuideLst xmlns:p15="http://schemas.microsoft.com/office/powerpoint/2012/main"/>
+    </p:ext>
+  </p:extLst>
 </p:presentation>
 </file>
 
@@ -2055,7 +2060,7 @@
           <a:p>
             <a:fld id="{4AAD347D-5ACD-4C99-B74B-A9C85AD731AF}" type="datetimeFigureOut">
               <a:rPr lang="en-US" dirty="0"/>
-              <a:t>7/31/2017</a:t>
+              <a:t>8/1/2017</a:t>
             </a:fld>
             <a:endParaRPr lang="en-US" dirty="0"/>
           </a:p>
@@ -2345,7 +2350,7 @@
           <a:p>
             <a:fld id="{4509A250-FF31-4206-8172-F9D3106AACB1}" type="datetimeFigureOut">
               <a:rPr lang="en-US" dirty="0"/>
-              <a:t>7/31/2017</a:t>
+              <a:t>8/1/2017</a:t>
             </a:fld>
             <a:endParaRPr lang="en-US" dirty="0"/>
           </a:p>
@@ -2554,7 +2559,7 @@
           <a:p>
             <a:fld id="{4509A250-FF31-4206-8172-F9D3106AACB1}" type="datetimeFigureOut">
               <a:rPr lang="en-US" dirty="0"/>
-              <a:t>7/31/2017</a:t>
+              <a:t>8/1/2017</a:t>
             </a:fld>
             <a:endParaRPr lang="en-US" dirty="0"/>
           </a:p>
@@ -2842,7 +2847,7 @@
           <a:p>
             <a:fld id="{4509A250-FF31-4206-8172-F9D3106AACB1}" type="datetimeFigureOut">
               <a:rPr lang="en-US" dirty="0"/>
-              <a:t>7/31/2017</a:t>
+              <a:t>8/1/2017</a:t>
             </a:fld>
             <a:endParaRPr lang="en-US" dirty="0"/>
           </a:p>
@@ -3198,7 +3203,7 @@
           <a:p>
             <a:fld id="{4509A250-FF31-4206-8172-F9D3106AACB1}" type="datetimeFigureOut">
               <a:rPr lang="en-US" dirty="0"/>
-              <a:t>7/31/2017</a:t>
+              <a:t>8/1/2017</a:t>
             </a:fld>
             <a:endParaRPr lang="en-US" dirty="0"/>
           </a:p>
@@ -3836,7 +3841,7 @@
           <a:p>
             <a:fld id="{4509A250-FF31-4206-8172-F9D3106AACB1}" type="datetimeFigureOut">
               <a:rPr lang="en-US" dirty="0"/>
-              <a:t>7/31/2017</a:t>
+              <a:t>8/1/2017</a:t>
             </a:fld>
             <a:endParaRPr lang="en-US" dirty="0"/>
           </a:p>
@@ -4711,7 +4716,7 @@
           <a:p>
             <a:fld id="{4509A250-FF31-4206-8172-F9D3106AACB1}" type="datetimeFigureOut">
               <a:rPr lang="en-US" dirty="0"/>
-              <a:t>7/31/2017</a:t>
+              <a:t>8/1/2017</a:t>
             </a:fld>
             <a:endParaRPr lang="en-US" dirty="0"/>
           </a:p>
@@ -4896,7 +4901,7 @@
           <a:p>
             <a:fld id="{4509A250-FF31-4206-8172-F9D3106AACB1}" type="datetimeFigureOut">
               <a:rPr lang="en-US" dirty="0"/>
-              <a:t>7/31/2017</a:t>
+              <a:t>8/1/2017</a:t>
             </a:fld>
             <a:endParaRPr lang="en-US" dirty="0"/>
           </a:p>
@@ -5091,7 +5096,7 @@
           <a:p>
             <a:fld id="{4509A250-FF31-4206-8172-F9D3106AACB1}" type="datetimeFigureOut">
               <a:rPr lang="en-US" dirty="0"/>
-              <a:t>7/31/2017</a:t>
+              <a:t>8/1/2017</a:t>
             </a:fld>
             <a:endParaRPr lang="en-US" dirty="0"/>
           </a:p>
@@ -5509,7 +5514,7 @@
           <a:p>
             <a:fld id="{4509A250-FF31-4206-8172-F9D3106AACB1}" type="datetimeFigureOut">
               <a:rPr lang="en-US" dirty="0"/>
-              <a:t>7/31/2017</a:t>
+              <a:t>8/1/2017</a:t>
             </a:fld>
             <a:endParaRPr lang="en-US" dirty="0"/>
           </a:p>
@@ -5771,7 +5776,7 @@
           <a:p>
             <a:fld id="{9796027F-7875-4030-9381-8BD8C4F21935}" type="datetimeFigureOut">
               <a:rPr lang="en-US" dirty="0"/>
-              <a:t>7/31/2017</a:t>
+              <a:t>8/1/2017</a:t>
             </a:fld>
             <a:endParaRPr lang="en-US" dirty="0"/>
           </a:p>
@@ -6078,7 +6083,7 @@
           <a:p>
             <a:fld id="{9796027F-7875-4030-9381-8BD8C4F21935}" type="datetimeFigureOut">
               <a:rPr lang="en-US" dirty="0"/>
-              <a:t>7/31/2017</a:t>
+              <a:t>8/1/2017</a:t>
             </a:fld>
             <a:endParaRPr lang="en-US" dirty="0"/>
           </a:p>
@@ -6537,7 +6542,7 @@
           <a:p>
             <a:fld id="{9796027F-7875-4030-9381-8BD8C4F21935}" type="datetimeFigureOut">
               <a:rPr lang="en-US" dirty="0"/>
-              <a:t>7/31/2017</a:t>
+              <a:t>8/1/2017</a:t>
             </a:fld>
             <a:endParaRPr lang="en-US" dirty="0"/>
           </a:p>
@@ -6670,7 +6675,7 @@
           <a:p>
             <a:fld id="{4509A250-FF31-4206-8172-F9D3106AACB1}" type="datetimeFigureOut">
               <a:rPr lang="en-US" dirty="0"/>
-              <a:t>7/31/2017</a:t>
+              <a:t>8/1/2017</a:t>
             </a:fld>
             <a:endParaRPr lang="en-US" dirty="0"/>
           </a:p>
@@ -6780,7 +6785,7 @@
           <a:p>
             <a:fld id="{4509A250-FF31-4206-8172-F9D3106AACB1}" type="datetimeFigureOut">
               <a:rPr lang="en-US" dirty="0"/>
-              <a:t>7/31/2017</a:t>
+              <a:t>8/1/2017</a:t>
             </a:fld>
             <a:endParaRPr lang="en-US" dirty="0"/>
           </a:p>
@@ -7065,7 +7070,7 @@
           <a:p>
             <a:fld id="{4509A250-FF31-4206-8172-F9D3106AACB1}" type="datetimeFigureOut">
               <a:rPr lang="en-US" dirty="0"/>
-              <a:t>7/31/2017</a:t>
+              <a:t>8/1/2017</a:t>
             </a:fld>
             <a:endParaRPr lang="en-US" dirty="0"/>
           </a:p>
@@ -7355,7 +7360,7 @@
           <a:p>
             <a:fld id="{4509A250-FF31-4206-8172-F9D3106AACB1}" type="datetimeFigureOut">
               <a:rPr lang="en-US" dirty="0"/>
-              <a:t>7/31/2017</a:t>
+              <a:t>8/1/2017</a:t>
             </a:fld>
             <a:endParaRPr lang="en-US" dirty="0"/>
           </a:p>
@@ -7799,7 +7804,7 @@
           <a:p>
             <a:fld id="{4AAD347D-5ACD-4C99-B74B-A9C85AD731AF}" type="datetimeFigureOut">
               <a:rPr lang="en-US" dirty="0"/>
-              <a:t>7/31/2017</a:t>
+              <a:t>8/1/2017</a:t>
             </a:fld>
             <a:endParaRPr lang="en-US" dirty="0"/>
           </a:p>
@@ -8531,8 +8536,42 @@
             </a:pPr>
             <a:r>
               <a:rPr lang="en" dirty="0" smtClean="0"/>
-              <a:t>Also, the styles were generated via manual research and encoding, so there may be some inaccuracies in that data.</a:t>
-            </a:r>
+              <a:t>Also, the styles were generated via manual research and encoding, so there may be some inaccuracies in that data</a:t>
+            </a:r>
+            <a:r>
+              <a:rPr lang="en" dirty="0" smtClean="0"/>
+              <a:t>.</a:t>
+            </a:r>
+          </a:p>
+          <a:p>
+            <a:pPr lvl="0" rtl="0">
+              <a:spcBef>
+                <a:spcPts val="0"/>
+              </a:spcBef>
+              <a:buNone/>
+            </a:pPr>
+            <a:endParaRPr lang="en" dirty="0"/>
+          </a:p>
+          <a:p>
+            <a:pPr lvl="0" rtl="0">
+              <a:spcBef>
+                <a:spcPts val="0"/>
+              </a:spcBef>
+              <a:buNone/>
+            </a:pPr>
+            <a:r>
+              <a:rPr lang="en" dirty="0" smtClean="0"/>
+              <a:t>Some styles were too broad/general to </a:t>
+            </a:r>
+            <a:r>
+              <a:rPr lang="en" smtClean="0"/>
+              <a:t>be pinpointed </a:t>
+            </a:r>
+            <a:r>
+              <a:rPr lang="en" dirty="0" smtClean="0"/>
+              <a:t>to a specific country (i.e. “light lager”) and such beers were given a beer_origin label of “General” and were excluded from the analysis.</a:t>
+            </a:r>
+            <a:endParaRPr lang="en" dirty="0" smtClean="0"/>
           </a:p>
           <a:p>
             <a:pPr lvl="0" rtl="0">
@@ -9361,11 +9400,7 @@
             </a:pPr>
             <a:r>
               <a:rPr lang="en-US" dirty="0"/>
-              <a:t>This analysis utilized a </a:t>
-            </a:r>
-            <a:r>
-              <a:rPr lang="en-US" dirty="0"/>
-              <a:t>dataset containing ~1.5 million user reviews of beers from the </a:t>
+              <a:t>This analysis utilized a dataset containing ~1.5 million user reviews of beers from the </a:t>
             </a:r>
             <a:r>
               <a:rPr lang="en-US" dirty="0" smtClean="0"/>
@@ -9375,7 +9410,6 @@
               <a:rPr lang="en-US" dirty="0"/>
               <a:t>beeradvocate.com. </a:t>
             </a:r>
-            <a:endParaRPr lang="en-US" dirty="0"/>
           </a:p>
           <a:p>
             <a:pPr marL="0" indent="0">
@@ -10399,15 +10433,7 @@
             </a:pPr>
             <a:r>
               <a:rPr lang="en-US" sz="1050" dirty="0"/>
-              <a:t>From the correlation plots, each </a:t>
-            </a:r>
-            <a:r>
-              <a:rPr lang="en-US" sz="1050" dirty="0"/>
-              <a:t>of </a:t>
-            </a:r>
-            <a:r>
-              <a:rPr lang="en-US" sz="1050" dirty="0"/>
-              <a:t>the beer attributes </a:t>
+              <a:t>From the correlation plots, each of the beer attributes </a:t>
             </a:r>
             <a:r>
               <a:rPr lang="en-US" sz="1050" dirty="0" smtClean="0"/>
@@ -10415,15 +10441,7 @@
             </a:r>
             <a:r>
               <a:rPr lang="en-US" sz="1050" dirty="0"/>
-              <a:t>a </a:t>
-            </a:r>
-            <a:r>
-              <a:rPr lang="en-US" sz="1050" dirty="0"/>
-              <a:t>positive linear relationship with </a:t>
-            </a:r>
-            <a:r>
-              <a:rPr lang="en-US" sz="1050" dirty="0"/>
-              <a:t>overall review </a:t>
+              <a:t>a positive linear relationship with overall review </a:t>
             </a:r>
             <a:r>
               <a:rPr lang="en-US" sz="1050" dirty="0" smtClean="0"/>
@@ -10443,25 +10461,8 @@
             </a:pPr>
             <a:r>
               <a:rPr lang="en-US" sz="1050" dirty="0"/>
-              <a:t>We </a:t>
-            </a:r>
-            <a:r>
-              <a:rPr lang="en-US" sz="1050" dirty="0"/>
-              <a:t>can also see that the scatterplot for taste and palate are more tightly grouped together along an imaginary linear regression line compared to appearance and aroma, </a:t>
-            </a:r>
-            <a:r>
-              <a:rPr lang="en-US" sz="1050" dirty="0"/>
-              <a:t>showing that </a:t>
-            </a:r>
-            <a:r>
-              <a:rPr lang="en-US" sz="1050" dirty="0"/>
-              <a:t>these 2 attributes are more likely to play a role in the overall review score of a beer</a:t>
-            </a:r>
-            <a:r>
-              <a:rPr lang="en-US" sz="1050" dirty="0"/>
-              <a:t>.</a:t>
-            </a:r>
-            <a:endParaRPr lang="en-US" sz="1050" dirty="0"/>
+              <a:t>We can also see that the scatterplot for taste and palate are more tightly grouped together along an imaginary linear regression line compared to appearance and aroma, showing that these 2 attributes are more likely to play a role in the overall review score of a beer.</a:t>
+            </a:r>
           </a:p>
         </p:txBody>
       </p:sp>

</xml_diff>

<commit_message>
Change 'American' label to 'USA' since American is a continent, proofread and edit final draft of powerpoint presentation for EDX UCSD Python For Data Science final project
</commit_message>
<xml_diff>
--- a/Python/UCSD/PythonForDataScience/Week9/DSE_200X_FinalProjectPresentation.pptx
+++ b/Python/UCSD/PythonForDataScience/Week9/DSE_200X_FinalProjectPresentation.pptx
@@ -8536,11 +8536,7 @@
             </a:pPr>
             <a:r>
               <a:rPr lang="en" dirty="0" smtClean="0"/>
-              <a:t>Also, the styles were generated via manual research and encoding, so there may be some inaccuracies in that data</a:t>
-            </a:r>
-            <a:r>
-              <a:rPr lang="en" dirty="0" smtClean="0"/>
-              <a:t>.</a:t>
+              <a:t>Also, the styles were generated via manual research and encoding, so there may be some inaccuracies in that data.</a:t>
             </a:r>
           </a:p>
           <a:p>
@@ -8571,7 +8567,6 @@
               <a:rPr lang="en" dirty="0" smtClean="0"/>
               <a:t>to a specific country (i.e. “light lager”) and such beers were given a beer_origin label of “General” and were excluded from the analysis.</a:t>
             </a:r>
-            <a:endParaRPr lang="en" dirty="0" smtClean="0"/>
           </a:p>
           <a:p>
             <a:pPr lvl="0" rtl="0">
@@ -9050,7 +9045,39 @@
             </a:pPr>
             <a:r>
               <a:rPr lang="en-US" sz="1200" dirty="0" smtClean="0"/>
-              <a:t>Using a dataset containing ~1.5 million user reviews of beers from over the past 10 years via the website beeradvocate.com, the primary research question in this analysis was  whether there is a significant difference in the ratings of highly-rate American, German, and Belgian-style beers, as they were the top 3 origins for number of reviews. </a:t>
+              <a:t>Using a dataset containing ~1.5 million user reviews of beers from over the past 10 years via the website beeradvocate.com, the primary research question in this analysis was </a:t>
+            </a:r>
+            <a:r>
+              <a:rPr lang="en-US" sz="1200" dirty="0" smtClean="0"/>
+              <a:t>whether or not there </a:t>
+            </a:r>
+            <a:r>
+              <a:rPr lang="en-US" sz="1200" dirty="0" smtClean="0"/>
+              <a:t>is a significant difference in the ratings of </a:t>
+            </a:r>
+            <a:r>
+              <a:rPr lang="en-US" sz="1200" dirty="0" smtClean="0"/>
+              <a:t>US, </a:t>
+            </a:r>
+            <a:r>
+              <a:rPr lang="en-US" sz="1200" dirty="0" smtClean="0"/>
+              <a:t>German, and Belgian-style beers, as they were the top </a:t>
+            </a:r>
+            <a:r>
+              <a:rPr lang="en-US" sz="1200" dirty="0"/>
+              <a:t>3 style </a:t>
+            </a:r>
+            <a:r>
+              <a:rPr lang="en-US" sz="1200" dirty="0" smtClean="0"/>
+              <a:t>origin </a:t>
+            </a:r>
+            <a:r>
+              <a:rPr lang="en-US" sz="1200" dirty="0" smtClean="0"/>
+              <a:t>countries, in terms of number </a:t>
+            </a:r>
+            <a:r>
+              <a:rPr lang="en-US" sz="1200" dirty="0" smtClean="0"/>
+              <a:t>of reviews. </a:t>
             </a:r>
           </a:p>
           <a:p>
@@ -9065,7 +9092,23 @@
             </a:pPr>
             <a:r>
               <a:rPr lang="en-US" sz="1200" dirty="0" smtClean="0"/>
-              <a:t>The different populations were inspected via histograms of their scores, as well as via an ANOVA test, which showed that there was indeed a significant difference in the overall beer review score based on beer style’s country of origin.</a:t>
+              <a:t>The different populations were inspected via histograms of their scores, as well as via an ANOVA </a:t>
+            </a:r>
+            <a:r>
+              <a:rPr lang="en-US" sz="1200" dirty="0" smtClean="0"/>
+              <a:t>test, </a:t>
+            </a:r>
+            <a:r>
+              <a:rPr lang="en-US" sz="1200" dirty="0" smtClean="0"/>
+              <a:t>which showed that there was indeed a significant difference in the overall beer review </a:t>
+            </a:r>
+            <a:r>
+              <a:rPr lang="en-US" sz="1200" dirty="0" smtClean="0"/>
+              <a:t>score for the three sampling distributions </a:t>
+            </a:r>
+            <a:r>
+              <a:rPr lang="en-US" sz="1200" dirty="0" smtClean="0"/>
+              <a:t>based on beer style’s country of origin.</a:t>
             </a:r>
           </a:p>
           <a:p>
@@ -9080,7 +9123,31 @@
             </a:pPr>
             <a:r>
               <a:rPr lang="en-US" sz="1200" dirty="0" smtClean="0"/>
-              <a:t>A t-test was then performed for each pair of the 3 country, with the conclusion that, according to beeradvocate.com users, Belgium makes the best kind of beer, followed by the United States, and then Germany.</a:t>
+              <a:t>A t-test was then performed for each pair of the 3 </a:t>
+            </a:r>
+            <a:r>
+              <a:rPr lang="en-US" sz="1200" dirty="0" smtClean="0"/>
+              <a:t>countries, </a:t>
+            </a:r>
+            <a:r>
+              <a:rPr lang="en-US" sz="1200" dirty="0" smtClean="0"/>
+              <a:t>with the conclusion that, according to beeradvocate.com users, Belgium makes the best </a:t>
+            </a:r>
+            <a:r>
+              <a:rPr lang="en-US" sz="1200" dirty="0" smtClean="0"/>
+              <a:t>beer</a:t>
+            </a:r>
+            <a:r>
+              <a:rPr lang="en-US" sz="1200" dirty="0" smtClean="0"/>
+              <a:t>, followed by the </a:t>
+            </a:r>
+            <a:r>
+              <a:rPr lang="en-US" sz="1200" dirty="0" smtClean="0"/>
+              <a:t>USA, </a:t>
+            </a:r>
+            <a:r>
+              <a:rPr lang="en-US" sz="1200" dirty="0" smtClean="0"/>
+              <a:t>and then Germany.</a:t>
             </a:r>
           </a:p>
           <a:p>
@@ -9095,7 +9162,23 @@
             </a:pPr>
             <a:r>
               <a:rPr lang="en-US" sz="1200" dirty="0" smtClean="0"/>
-              <a:t>There were also 2 additional questions of whether overall scores of American beer have increased over time via a line graph, which sadly they had not.</a:t>
+              <a:t>There were also 2 additional questions of whether </a:t>
+            </a:r>
+            <a:r>
+              <a:rPr lang="en-US" sz="1200" dirty="0" smtClean="0"/>
+              <a:t>average overall </a:t>
+            </a:r>
+            <a:r>
+              <a:rPr lang="en-US" sz="1200" dirty="0" smtClean="0"/>
+              <a:t>scores of </a:t>
+            </a:r>
+            <a:r>
+              <a:rPr lang="en-US" sz="1200" dirty="0" smtClean="0"/>
+              <a:t>US beer </a:t>
+            </a:r>
+            <a:r>
+              <a:rPr lang="en-US" sz="1200" dirty="0" smtClean="0"/>
+              <a:t>have increased over time via a line graph, which sadly they had not.</a:t>
             </a:r>
           </a:p>
           <a:p>
@@ -9110,7 +9193,23 @@
             </a:pPr>
             <a:r>
               <a:rPr lang="en-US" sz="1200" dirty="0" smtClean="0"/>
-              <a:t>Then, I looked to see if which qualities, if any, (from aroma, taste, appearance, palate) significantly affect the overall score of a beer, and found that taste and then palate affected the score the most of these qualities, with appearance and aroma being less important to beeradvocate.com users.</a:t>
+              <a:t>Then, I looked to see </a:t>
+            </a:r>
+            <a:r>
+              <a:rPr lang="en-US" sz="1200" dirty="0" smtClean="0"/>
+              <a:t>which </a:t>
+            </a:r>
+            <a:r>
+              <a:rPr lang="en-US" sz="1200" dirty="0" smtClean="0"/>
+              <a:t>qualities, if any, (from aroma, taste, appearance, palate) significantly affect the overall score of a beer, and found that taste and then palate </a:t>
+            </a:r>
+            <a:r>
+              <a:rPr lang="en-US" sz="1200" dirty="0" smtClean="0"/>
+              <a:t>had the greatest impact on overall score, </a:t>
+            </a:r>
+            <a:r>
+              <a:rPr lang="en-US" sz="1200" dirty="0" smtClean="0"/>
+              <a:t>with appearance and aroma being less important to beeradvocate.com users.</a:t>
             </a:r>
           </a:p>
           <a:p>
@@ -9177,7 +9276,7 @@
               <a:buNone/>
             </a:pPr>
             <a:r>
-              <a:rPr lang="en"/>
+              <a:rPr lang="en" dirty="0"/>
               <a:t>Motivation</a:t>
             </a:r>
           </a:p>
@@ -9220,7 +9319,27 @@
             </a:r>
             <a:r>
               <a:rPr lang="en" dirty="0" smtClean="0"/>
-              <a:t>t American beer is of lesser quality, while the European countries of Germany and Belgium craft the highest quality brews. </a:t>
+              <a:t>t </a:t>
+            </a:r>
+            <a:r>
+              <a:rPr lang="en" dirty="0" smtClean="0"/>
+              <a:t>US </a:t>
+            </a:r>
+            <a:r>
+              <a:rPr lang="en" dirty="0" smtClean="0"/>
+              <a:t>beer </a:t>
+            </a:r>
+            <a:r>
+              <a:rPr lang="en" dirty="0" smtClean="0"/>
+              <a:t>is of </a:t>
+            </a:r>
+            <a:r>
+              <a:rPr lang="en" dirty="0" smtClean="0"/>
+              <a:t>a lesser </a:t>
+            </a:r>
+            <a:r>
+              <a:rPr lang="en" dirty="0" smtClean="0"/>
+              <a:t>quality, while the European countries of Germany and Belgium craft the highest quality brews. </a:t>
             </a:r>
           </a:p>
           <a:p>
@@ -9423,11 +9542,27 @@
             </a:pPr>
             <a:r>
               <a:rPr lang="en-US" dirty="0"/>
-              <a:t>The reviews span over 10 years, up to and including November 2011 and include ratings </a:t>
+              <a:t>The reviews span over 10 years, up to and including November </a:t>
             </a:r>
             <a:r>
               <a:rPr lang="en-US" dirty="0" smtClean="0"/>
-              <a:t>in 	terms </a:t>
+              <a:t>2011, </a:t>
+            </a:r>
+            <a:r>
+              <a:rPr lang="en-US" dirty="0"/>
+              <a:t>and </a:t>
+            </a:r>
+            <a:r>
+              <a:rPr lang="en-US" dirty="0" smtClean="0"/>
+              <a:t>includes </a:t>
+            </a:r>
+            <a:r>
+              <a:rPr lang="en-US" dirty="0"/>
+              <a:t>ratings </a:t>
+            </a:r>
+            <a:r>
+              <a:rPr lang="en-US" dirty="0" smtClean="0"/>
+              <a:t>	in terms </a:t>
             </a:r>
             <a:r>
               <a:rPr lang="en-US" dirty="0"/>
@@ -9564,33 +9699,16 @@
           </a:bodyPr>
           <a:lstStyle/>
           <a:p>
-            <a:pPr lvl="0" rtl="0">
-              <a:spcBef>
-                <a:spcPts val="0"/>
-              </a:spcBef>
+            <a:pPr>
               <a:buNone/>
             </a:pPr>
             <a:r>
               <a:rPr lang="en" dirty="0" smtClean="0"/>
-              <a:t>At a high-level, what did you need to do to prepare the data for analysis?  Describe what problems, if any, did you encounter with the dataset?</a:t>
-            </a:r>
-          </a:p>
-          <a:p>
-            <a:pPr lvl="0" rtl="0">
-              <a:spcBef>
-                <a:spcPts val="0"/>
-              </a:spcBef>
-              <a:buNone/>
-            </a:pPr>
-            <a:endParaRPr lang="en" dirty="0"/>
-          </a:p>
-          <a:p>
-            <a:pPr>
-              <a:buNone/>
-            </a:pPr>
+              <a:t>Luckily</a:t>
+            </a:r>
             <a:r>
               <a:rPr lang="en" dirty="0"/>
-              <a:t>Luckily, this dataset was </a:t>
+              <a:t>, this dataset was </a:t>
             </a:r>
             <a:r>
               <a:rPr lang="en" dirty="0" smtClean="0"/>
@@ -9763,15 +9881,35 @@
             </a:r>
             <a:r>
               <a:rPr lang="en-US" dirty="0" smtClean="0"/>
-              <a:t>highly-rated (review score &gt; 	2.5) American</a:t>
+              <a:t>beers whose style originate 	from the USA, Germany, </a:t>
             </a:r>
             <a:r>
               <a:rPr lang="en-US" dirty="0"/>
-              <a:t>, German, and Belgian-style beers, as they were the top 3 origins </a:t>
+              <a:t>and </a:t>
             </a:r>
             <a:r>
               <a:rPr lang="en-US" dirty="0" smtClean="0"/>
-              <a:t>in	number </a:t>
+              <a:t>Belgium, </a:t>
+            </a:r>
+            <a:r>
+              <a:rPr lang="en-US" dirty="0"/>
+              <a:t>as they were the top 3 </a:t>
+            </a:r>
+            <a:r>
+              <a:rPr lang="en-US" dirty="0" smtClean="0"/>
+              <a:t>style origin countries, in</a:t>
+            </a:r>
+            <a:r>
+              <a:rPr lang="en-US" dirty="0"/>
+              <a:t> </a:t>
+            </a:r>
+            <a:r>
+              <a:rPr lang="en-US" dirty="0" smtClean="0"/>
+              <a:t>	terms of </a:t>
+            </a:r>
+            <a:r>
+              <a:rPr lang="en-US" dirty="0" smtClean="0"/>
+              <a:t>number </a:t>
             </a:r>
             <a:r>
               <a:rPr lang="en-US" dirty="0"/>
@@ -9808,7 +9946,11 @@
             </a:r>
             <a:r>
               <a:rPr lang="en-US" dirty="0" smtClean="0"/>
-              <a:t>has 2 </a:t>
+              <a:t>had </a:t>
+            </a:r>
+            <a:r>
+              <a:rPr lang="en-US" dirty="0" smtClean="0"/>
+              <a:t>2 </a:t>
             </a:r>
             <a:r>
               <a:rPr lang="en-US" dirty="0"/>
@@ -9820,7 +9962,11 @@
             </a:r>
             <a:r>
               <a:rPr lang="en-US" dirty="0"/>
-              <a:t>scores of American beer </a:t>
+              <a:t>scores of </a:t>
+            </a:r>
+            <a:r>
+              <a:rPr lang="en-US" dirty="0" smtClean="0"/>
+              <a:t>US beer </a:t>
             </a:r>
             <a:r>
               <a:rPr lang="en-US" dirty="0" smtClean="0"/>
@@ -9965,7 +10111,15 @@
             </a:pPr>
             <a:r>
               <a:rPr lang="en" dirty="0" smtClean="0"/>
-              <a:t>Since a signficant difference was found, t-tests were performed to find out between which sampling distributions the significant difference(s) had occur</a:t>
+              <a:t>Since a </a:t>
+            </a:r>
+            <a:r>
+              <a:rPr lang="en" dirty="0" smtClean="0"/>
+              <a:t>significant </a:t>
+            </a:r>
+            <a:r>
+              <a:rPr lang="en" dirty="0" smtClean="0"/>
+              <a:t>difference was found, t-tests were performed to find out between which sampling distributions the significant difference(s) had occur</a:t>
             </a:r>
             <a:r>
               <a:rPr lang="en-US" dirty="0" smtClean="0"/>
@@ -9988,7 +10142,15 @@
             </a:pPr>
             <a:r>
               <a:rPr lang="en" dirty="0" smtClean="0"/>
-              <a:t>Finally, a time-series plot of the average American overall review score was plotted to answer the 1</a:t>
+              <a:t>Finally, a time-series plot of the average </a:t>
+            </a:r>
+            <a:r>
+              <a:rPr lang="en" dirty="0" smtClean="0"/>
+              <a:t>US overall </a:t>
+            </a:r>
+            <a:r>
+              <a:rPr lang="en" dirty="0" smtClean="0"/>
+              <a:t>review score was plotted to answer the 1</a:t>
             </a:r>
             <a:r>
               <a:rPr lang="en" baseline="30000" dirty="0" smtClean="0"/>
@@ -10140,7 +10302,15 @@
             </a:r>
             <a:r>
               <a:rPr lang="en-US" sz="1200" dirty="0"/>
-              <a:t>Belgian beers tend to be rated the highest, followed by American beers, and ending with German beers, which are still pretty highly rated with a median score of close to 3.8</a:t>
+              <a:t>Belgian beers tend to be rated the highest, followed by </a:t>
+            </a:r>
+            <a:r>
+              <a:rPr lang="en-US" sz="1200" dirty="0" smtClean="0"/>
+              <a:t>US beers</a:t>
+            </a:r>
+            <a:r>
+              <a:rPr lang="en-US" sz="1200" dirty="0"/>
+              <a:t>, and ending with German beers, which are still pretty highly rated with a median score of close to 3.8</a:t>
             </a:r>
             <a:r>
               <a:rPr lang="en-US" sz="1200" dirty="0" smtClean="0"/>
@@ -10159,7 +10329,23 @@
             </a:pPr>
             <a:r>
               <a:rPr lang="en-US" sz="1200" dirty="0" smtClean="0"/>
-              <a:t>From the ANOVA test, we had an f-statistic &gt;100 and a miniscule p-value, telling us that there was a indeed a significant difference between these sampling distributions.</a:t>
+              <a:t>From the ANOVA test, we had </a:t>
+            </a:r>
+            <a:r>
+              <a:rPr lang="en-US" sz="1200" dirty="0" smtClean="0"/>
+              <a:t>a very high </a:t>
+            </a:r>
+            <a:r>
+              <a:rPr lang="en-US" sz="1200" dirty="0" smtClean="0"/>
+              <a:t>f-statistic </a:t>
+            </a:r>
+            <a:r>
+              <a:rPr lang="en-US" sz="1200" dirty="0" smtClean="0"/>
+              <a:t>and </a:t>
+            </a:r>
+            <a:r>
+              <a:rPr lang="en-US" sz="1200" dirty="0" smtClean="0"/>
+              <a:t>a miniscule p-value, telling us that there was a indeed a significant difference between these sampling distributions.</a:t>
             </a:r>
           </a:p>
           <a:p>
@@ -10174,7 +10360,15 @@
             </a:pPr>
             <a:r>
               <a:rPr lang="en-US" sz="1200" dirty="0" smtClean="0"/>
-              <a:t>After performing 3 t-tests, we found that each sampling distribution was significantly different than the other 2, with the difference between Belgium and German beers being the greatest, and Belgian beers being rated higher than both American and German-style beers.</a:t>
+              <a:t>After performing 3 t-tests, we found that each sampling distribution was significantly different than the other 2, with the difference between Belgium and German beers being the greatest, and Belgian beers being rated higher than both </a:t>
+            </a:r>
+            <a:r>
+              <a:rPr lang="en-US" sz="1200" dirty="0" smtClean="0"/>
+              <a:t>US and </a:t>
+            </a:r>
+            <a:r>
+              <a:rPr lang="en-US" sz="1200" dirty="0" smtClean="0"/>
+              <a:t>German-style beers.</a:t>
             </a:r>
             <a:endParaRPr lang="en" sz="1400" dirty="0"/>
           </a:p>
@@ -10182,7 +10376,7 @@
       </p:sp>
       <p:pic>
         <p:nvPicPr>
-          <p:cNvPr id="3" name="Picture 2"/>
+          <p:cNvPr id="2" name="Picture 1"/>
           <p:cNvPicPr>
             <a:picLocks noChangeAspect="1"/>
           </p:cNvPicPr>
@@ -10196,8 +10390,8 @@
         </p:blipFill>
         <p:spPr>
           <a:xfrm>
-            <a:off x="4800558" y="1017725"/>
-            <a:ext cx="4204684" cy="1870200"/>
+            <a:off x="4880068" y="1017725"/>
+            <a:ext cx="4125174" cy="1878884"/>
           </a:xfrm>
           <a:prstGeom prst="rect">
             <a:avLst/>
@@ -10206,7 +10400,7 @@
       </p:pic>
       <p:pic>
         <p:nvPicPr>
-          <p:cNvPr id="5" name="Picture 4"/>
+          <p:cNvPr id="4" name="Picture 3"/>
           <p:cNvPicPr>
             <a:picLocks noChangeAspect="1"/>
           </p:cNvPicPr>
@@ -10220,8 +10414,8 @@
         </p:blipFill>
         <p:spPr>
           <a:xfrm>
-            <a:off x="5267843" y="3118170"/>
-            <a:ext cx="3737399" cy="1619353"/>
+            <a:off x="5446929" y="3255339"/>
+            <a:ext cx="3164219" cy="1451107"/>
           </a:xfrm>
           <a:prstGeom prst="rect">
             <a:avLst/>
@@ -10329,7 +10523,15 @@
             </a:pPr>
             <a:r>
               <a:rPr lang="en-US" sz="1050" dirty="0" smtClean="0"/>
-              <a:t>Froe the time series plot of average American overall </a:t>
+              <a:t>Froe the time series plot of average </a:t>
+            </a:r>
+            <a:r>
+              <a:rPr lang="en-US" sz="1050" dirty="0" smtClean="0"/>
+              <a:t>US </a:t>
+            </a:r>
+            <a:r>
+              <a:rPr lang="en-US" sz="1050" dirty="0" smtClean="0"/>
+              <a:t>overall </a:t>
             </a:r>
             <a:r>
               <a:rPr lang="en-US" sz="1050" dirty="0"/>
@@ -10417,7 +10619,15 @@
             </a:pPr>
             <a:r>
               <a:rPr lang="en-US" sz="1050" dirty="0"/>
-              <a:t>So unfortunately, American beer seems to have *not* gotten better over time, at least according to beeradvocate.com users. </a:t>
+              <a:t>So unfortunately, </a:t>
+            </a:r>
+            <a:r>
+              <a:rPr lang="en-US" sz="1050" dirty="0" smtClean="0"/>
+              <a:t>US beer </a:t>
+            </a:r>
+            <a:r>
+              <a:rPr lang="en-US" sz="1050" dirty="0"/>
+              <a:t>seems to have *not* gotten better over time, at least according to beeradvocate.com users. </a:t>
             </a:r>
             <a:endParaRPr lang="en-US" sz="1050" dirty="0" smtClean="0"/>
           </a:p>
@@ -10468,7 +10678,7 @@
       </p:sp>
       <p:pic>
         <p:nvPicPr>
-          <p:cNvPr id="4" name="Picture 3"/>
+          <p:cNvPr id="2" name="Picture 1"/>
           <p:cNvPicPr>
             <a:picLocks noChangeAspect="1"/>
           </p:cNvPicPr>
@@ -10482,8 +10692,8 @@
         </p:blipFill>
         <p:spPr>
           <a:xfrm>
-            <a:off x="5451639" y="629221"/>
-            <a:ext cx="2160665" cy="1831164"/>
+            <a:off x="5395251" y="445025"/>
+            <a:ext cx="2371504" cy="2168050"/>
           </a:xfrm>
           <a:prstGeom prst="rect">
             <a:avLst/>
@@ -10492,7 +10702,7 @@
       </p:pic>
       <p:pic>
         <p:nvPicPr>
-          <p:cNvPr id="6" name="Picture 5"/>
+          <p:cNvPr id="3" name="Picture 2"/>
           <p:cNvPicPr>
             <a:picLocks noChangeAspect="1"/>
           </p:cNvPicPr>
@@ -10506,8 +10716,8 @@
         </p:blipFill>
         <p:spPr>
           <a:xfrm>
-            <a:off x="4124667" y="2661431"/>
-            <a:ext cx="4912672" cy="2089240"/>
+            <a:off x="4129927" y="2730043"/>
+            <a:ext cx="4902151" cy="2063806"/>
           </a:xfrm>
           <a:prstGeom prst="rect">
             <a:avLst/>

</xml_diff>

<commit_message>
Cut down on NULL value inspection output
</commit_message>
<xml_diff>
--- a/Python/UCSD/PythonForDataScience/Week9/DSE_200X_FinalProjectPresentation.pptx
+++ b/Python/UCSD/PythonForDataScience/Week9/DSE_200X_FinalProjectPresentation.pptx
@@ -8413,7 +8413,43 @@
             </a:r>
             <a:r>
               <a:rPr lang="en" dirty="0" smtClean="0"/>
-              <a:t>teve newns</a:t>
+              <a:t>teve </a:t>
+            </a:r>
+            <a:r>
+              <a:rPr lang="en" dirty="0" smtClean="0"/>
+              <a:t>newns</a:t>
+            </a:r>
+          </a:p>
+          <a:p>
+            <a:pPr lvl="0">
+              <a:spcBef>
+                <a:spcPts val="0"/>
+              </a:spcBef>
+              <a:buNone/>
+            </a:pPr>
+            <a:endParaRPr lang="en" dirty="0"/>
+          </a:p>
+          <a:p>
+            <a:pPr lvl="0">
+              <a:spcBef>
+                <a:spcPts val="0"/>
+              </a:spcBef>
+            </a:pPr>
+            <a:r>
+              <a:rPr lang="en-US" dirty="0">
+                <a:hlinkClick r:id="rId3"/>
+              </a:rPr>
+              <a:t>https://</a:t>
+            </a:r>
+            <a:r>
+              <a:rPr lang="en-US" dirty="0" smtClean="0">
+                <a:hlinkClick r:id="rId3"/>
+              </a:rPr>
+              <a:t>github.com/newns92/BeerAnalysis_python/blob/master/Python/BelgianVsAmericanBeer_samplingDistribution.ipynb</a:t>
+            </a:r>
+            <a:r>
+              <a:rPr lang="en-US" dirty="0" smtClean="0"/>
+              <a:t> </a:t>
             </a:r>
             <a:endParaRPr lang="en" dirty="0"/>
           </a:p>
@@ -9045,23 +9081,7 @@
             </a:pPr>
             <a:r>
               <a:rPr lang="en-US" sz="1200" dirty="0" smtClean="0"/>
-              <a:t>Using a dataset containing ~1.5 million user reviews of beers from over the past 10 years via the website beeradvocate.com, the primary research question in this analysis was </a:t>
-            </a:r>
-            <a:r>
-              <a:rPr lang="en-US" sz="1200" dirty="0" smtClean="0"/>
-              <a:t>whether or not there </a:t>
-            </a:r>
-            <a:r>
-              <a:rPr lang="en-US" sz="1200" dirty="0" smtClean="0"/>
-              <a:t>is a significant difference in the ratings of </a:t>
-            </a:r>
-            <a:r>
-              <a:rPr lang="en-US" sz="1200" dirty="0" smtClean="0"/>
-              <a:t>US, </a:t>
-            </a:r>
-            <a:r>
-              <a:rPr lang="en-US" sz="1200" dirty="0" smtClean="0"/>
-              <a:t>German, and Belgian-style beers, as they were the top </a:t>
+              <a:t>Using a dataset containing ~1.5 million user reviews of beers from over the past 10 years via the website beeradvocate.com, the primary research question in this analysis was whether or not there is a significant difference in the ratings of US, German, and Belgian-style beers, as they were the top </a:t>
             </a:r>
             <a:r>
               <a:rPr lang="en-US" sz="1200" dirty="0"/>
@@ -9069,15 +9089,37 @@
             </a:r>
             <a:r>
               <a:rPr lang="en-US" sz="1200" dirty="0" smtClean="0"/>
-              <a:t>origin </a:t>
-            </a:r>
+              <a:t>origin countries, in terms of number of reviews. </a:t>
+            </a:r>
+          </a:p>
+          <a:p>
+            <a:pPr>
+              <a:buNone/>
+            </a:pPr>
+            <a:endParaRPr lang="en-US" sz="1200" dirty="0" smtClean="0"/>
+          </a:p>
+          <a:p>
+            <a:pPr>
+              <a:buNone/>
+            </a:pPr>
             <a:r>
               <a:rPr lang="en-US" sz="1200" dirty="0" smtClean="0"/>
-              <a:t>countries, in terms of number </a:t>
-            </a:r>
+              <a:t>The different populations were inspected via histograms of their scores, as well as via an ANOVA test, which showed that there was indeed a significant difference in the overall beer review score for the three sampling distributions based on beer style’s country of origin.</a:t>
+            </a:r>
+          </a:p>
+          <a:p>
+            <a:pPr>
+              <a:buNone/>
+            </a:pPr>
+            <a:endParaRPr lang="en-US" sz="1200" dirty="0" smtClean="0"/>
+          </a:p>
+          <a:p>
+            <a:pPr>
+              <a:buNone/>
+            </a:pPr>
             <a:r>
               <a:rPr lang="en-US" sz="1200" dirty="0" smtClean="0"/>
-              <a:t>of reviews. </a:t>
+              <a:t>A t-test was then performed for each pair of the 3 countries, with the conclusion that, according to beeradvocate.com users, Belgium makes the best beer, followed by the USA, and then Germany.</a:t>
             </a:r>
           </a:p>
           <a:p>
@@ -9092,124 +9134,22 @@
             </a:pPr>
             <a:r>
               <a:rPr lang="en-US" sz="1200" dirty="0" smtClean="0"/>
-              <a:t>The different populations were inspected via histograms of their scores, as well as via an ANOVA </a:t>
-            </a:r>
+              <a:t>There were also 2 additional questions of whether average overall scores of US beer have increased over time via a line graph, which sadly they had not.</a:t>
+            </a:r>
+          </a:p>
+          <a:p>
+            <a:pPr>
+              <a:buNone/>
+            </a:pPr>
+            <a:endParaRPr lang="en-US" sz="1200" dirty="0" smtClean="0"/>
+          </a:p>
+          <a:p>
+            <a:pPr>
+              <a:buNone/>
+            </a:pPr>
             <a:r>
               <a:rPr lang="en-US" sz="1200" dirty="0" smtClean="0"/>
-              <a:t>test, </a:t>
-            </a:r>
-            <a:r>
-              <a:rPr lang="en-US" sz="1200" dirty="0" smtClean="0"/>
-              <a:t>which showed that there was indeed a significant difference in the overall beer review </a:t>
-            </a:r>
-            <a:r>
-              <a:rPr lang="en-US" sz="1200" dirty="0" smtClean="0"/>
-              <a:t>score for the three sampling distributions </a:t>
-            </a:r>
-            <a:r>
-              <a:rPr lang="en-US" sz="1200" dirty="0" smtClean="0"/>
-              <a:t>based on beer style’s country of origin.</a:t>
-            </a:r>
-          </a:p>
-          <a:p>
-            <a:pPr>
-              <a:buNone/>
-            </a:pPr>
-            <a:endParaRPr lang="en-US" sz="1200" dirty="0" smtClean="0"/>
-          </a:p>
-          <a:p>
-            <a:pPr>
-              <a:buNone/>
-            </a:pPr>
-            <a:r>
-              <a:rPr lang="en-US" sz="1200" dirty="0" smtClean="0"/>
-              <a:t>A t-test was then performed for each pair of the 3 </a:t>
-            </a:r>
-            <a:r>
-              <a:rPr lang="en-US" sz="1200" dirty="0" smtClean="0"/>
-              <a:t>countries, </a:t>
-            </a:r>
-            <a:r>
-              <a:rPr lang="en-US" sz="1200" dirty="0" smtClean="0"/>
-              <a:t>with the conclusion that, according to beeradvocate.com users, Belgium makes the best </a:t>
-            </a:r>
-            <a:r>
-              <a:rPr lang="en-US" sz="1200" dirty="0" smtClean="0"/>
-              <a:t>beer</a:t>
-            </a:r>
-            <a:r>
-              <a:rPr lang="en-US" sz="1200" dirty="0" smtClean="0"/>
-              <a:t>, followed by the </a:t>
-            </a:r>
-            <a:r>
-              <a:rPr lang="en-US" sz="1200" dirty="0" smtClean="0"/>
-              <a:t>USA, </a:t>
-            </a:r>
-            <a:r>
-              <a:rPr lang="en-US" sz="1200" dirty="0" smtClean="0"/>
-              <a:t>and then Germany.</a:t>
-            </a:r>
-          </a:p>
-          <a:p>
-            <a:pPr>
-              <a:buNone/>
-            </a:pPr>
-            <a:endParaRPr lang="en-US" sz="1200" dirty="0" smtClean="0"/>
-          </a:p>
-          <a:p>
-            <a:pPr>
-              <a:buNone/>
-            </a:pPr>
-            <a:r>
-              <a:rPr lang="en-US" sz="1200" dirty="0" smtClean="0"/>
-              <a:t>There were also 2 additional questions of whether </a:t>
-            </a:r>
-            <a:r>
-              <a:rPr lang="en-US" sz="1200" dirty="0" smtClean="0"/>
-              <a:t>average overall </a:t>
-            </a:r>
-            <a:r>
-              <a:rPr lang="en-US" sz="1200" dirty="0" smtClean="0"/>
-              <a:t>scores of </a:t>
-            </a:r>
-            <a:r>
-              <a:rPr lang="en-US" sz="1200" dirty="0" smtClean="0"/>
-              <a:t>US beer </a:t>
-            </a:r>
-            <a:r>
-              <a:rPr lang="en-US" sz="1200" dirty="0" smtClean="0"/>
-              <a:t>have increased over time via a line graph, which sadly they had not.</a:t>
-            </a:r>
-          </a:p>
-          <a:p>
-            <a:pPr>
-              <a:buNone/>
-            </a:pPr>
-            <a:endParaRPr lang="en-US" sz="1200" dirty="0" smtClean="0"/>
-          </a:p>
-          <a:p>
-            <a:pPr>
-              <a:buNone/>
-            </a:pPr>
-            <a:r>
-              <a:rPr lang="en-US" sz="1200" dirty="0" smtClean="0"/>
-              <a:t>Then, I looked to see </a:t>
-            </a:r>
-            <a:r>
-              <a:rPr lang="en-US" sz="1200" dirty="0" smtClean="0"/>
-              <a:t>which </a:t>
-            </a:r>
-            <a:r>
-              <a:rPr lang="en-US" sz="1200" dirty="0" smtClean="0"/>
-              <a:t>qualities, if any, (from aroma, taste, appearance, palate) significantly affect the overall score of a beer, and found that taste and then palate </a:t>
-            </a:r>
-            <a:r>
-              <a:rPr lang="en-US" sz="1200" dirty="0" smtClean="0"/>
-              <a:t>had the greatest impact on overall score, </a:t>
-            </a:r>
-            <a:r>
-              <a:rPr lang="en-US" sz="1200" dirty="0" smtClean="0"/>
-              <a:t>with appearance and aroma being less important to beeradvocate.com users.</a:t>
+              <a:t>Then, I looked to see which qualities, if any, (from aroma, taste, appearance, palate) significantly affect the overall score of a beer, and found that taste and then palate had the greatest impact on overall score, with appearance and aroma being less important to beeradvocate.com users.</a:t>
             </a:r>
           </a:p>
           <a:p>
@@ -9319,27 +9259,7 @@
             </a:r>
             <a:r>
               <a:rPr lang="en" dirty="0" smtClean="0"/>
-              <a:t>t </a:t>
-            </a:r>
-            <a:r>
-              <a:rPr lang="en" dirty="0" smtClean="0"/>
-              <a:t>US </a:t>
-            </a:r>
-            <a:r>
-              <a:rPr lang="en" dirty="0" smtClean="0"/>
-              <a:t>beer </a:t>
-            </a:r>
-            <a:r>
-              <a:rPr lang="en" dirty="0" smtClean="0"/>
-              <a:t>is of </a:t>
-            </a:r>
-            <a:r>
-              <a:rPr lang="en" dirty="0" smtClean="0"/>
-              <a:t>a lesser </a:t>
-            </a:r>
-            <a:r>
-              <a:rPr lang="en" dirty="0" smtClean="0"/>
-              <a:t>quality, while the European countries of Germany and Belgium craft the highest quality brews. </a:t>
+              <a:t>t US beer is of a lesser quality, while the European countries of Germany and Belgium craft the highest quality brews. </a:t>
             </a:r>
           </a:p>
           <a:p>
@@ -9905,11 +9825,7 @@
             </a:r>
             <a:r>
               <a:rPr lang="en-US" dirty="0" smtClean="0"/>
-              <a:t>	terms of </a:t>
-            </a:r>
-            <a:r>
-              <a:rPr lang="en-US" dirty="0" smtClean="0"/>
-              <a:t>number </a:t>
+              <a:t>	terms of number </a:t>
             </a:r>
             <a:r>
               <a:rPr lang="en-US" dirty="0"/>
@@ -9946,11 +9862,7 @@
             </a:r>
             <a:r>
               <a:rPr lang="en-US" dirty="0" smtClean="0"/>
-              <a:t>had </a:t>
-            </a:r>
-            <a:r>
-              <a:rPr lang="en-US" dirty="0" smtClean="0"/>
-              <a:t>2 </a:t>
+              <a:t>had 2 </a:t>
             </a:r>
             <a:r>
               <a:rPr lang="en-US" dirty="0"/>
@@ -9966,11 +9878,7 @@
             </a:r>
             <a:r>
               <a:rPr lang="en-US" dirty="0" smtClean="0"/>
-              <a:t>US beer </a:t>
-            </a:r>
-            <a:r>
-              <a:rPr lang="en-US" dirty="0" smtClean="0"/>
-              <a:t>	have </a:t>
+              <a:t>US beer 	have </a:t>
             </a:r>
             <a:r>
               <a:rPr lang="en-US" dirty="0"/>
@@ -10111,15 +10019,7 @@
             </a:pPr>
             <a:r>
               <a:rPr lang="en" dirty="0" smtClean="0"/>
-              <a:t>Since a </a:t>
-            </a:r>
-            <a:r>
-              <a:rPr lang="en" dirty="0" smtClean="0"/>
-              <a:t>significant </a:t>
-            </a:r>
-            <a:r>
-              <a:rPr lang="en" dirty="0" smtClean="0"/>
-              <a:t>difference was found, t-tests were performed to find out between which sampling distributions the significant difference(s) had occur</a:t>
+              <a:t>Since a significant difference was found, t-tests were performed to find out between which sampling distributions the significant difference(s) had occur</a:t>
             </a:r>
             <a:r>
               <a:rPr lang="en-US" dirty="0" smtClean="0"/>
@@ -10142,15 +10042,7 @@
             </a:pPr>
             <a:r>
               <a:rPr lang="en" dirty="0" smtClean="0"/>
-              <a:t>Finally, a time-series plot of the average </a:t>
-            </a:r>
-            <a:r>
-              <a:rPr lang="en" dirty="0" smtClean="0"/>
-              <a:t>US overall </a:t>
-            </a:r>
-            <a:r>
-              <a:rPr lang="en" dirty="0" smtClean="0"/>
-              <a:t>review score was plotted to answer the 1</a:t>
+              <a:t>Finally, a time-series plot of the average US overall review score was plotted to answer the 1</a:t>
             </a:r>
             <a:r>
               <a:rPr lang="en" baseline="30000" dirty="0" smtClean="0"/>
@@ -10329,46 +10221,22 @@
             </a:pPr>
             <a:r>
               <a:rPr lang="en-US" sz="1200" dirty="0" smtClean="0"/>
-              <a:t>From the ANOVA test, we had </a:t>
-            </a:r>
+              <a:t>From the ANOVA test, we had a very high f-statistic and a miniscule p-value, telling us that there was a indeed a significant difference between these sampling distributions.</a:t>
+            </a:r>
+          </a:p>
+          <a:p>
+            <a:pPr lvl="0">
+              <a:buNone/>
+            </a:pPr>
+            <a:endParaRPr lang="en-US" sz="1200" dirty="0" smtClean="0"/>
+          </a:p>
+          <a:p>
+            <a:pPr lvl="0">
+              <a:buNone/>
+            </a:pPr>
             <a:r>
               <a:rPr lang="en-US" sz="1200" dirty="0" smtClean="0"/>
-              <a:t>a very high </a:t>
-            </a:r>
-            <a:r>
-              <a:rPr lang="en-US" sz="1200" dirty="0" smtClean="0"/>
-              <a:t>f-statistic </a:t>
-            </a:r>
-            <a:r>
-              <a:rPr lang="en-US" sz="1200" dirty="0" smtClean="0"/>
-              <a:t>and </a:t>
-            </a:r>
-            <a:r>
-              <a:rPr lang="en-US" sz="1200" dirty="0" smtClean="0"/>
-              <a:t>a miniscule p-value, telling us that there was a indeed a significant difference between these sampling distributions.</a:t>
-            </a:r>
-          </a:p>
-          <a:p>
-            <a:pPr lvl="0">
-              <a:buNone/>
-            </a:pPr>
-            <a:endParaRPr lang="en-US" sz="1200" dirty="0" smtClean="0"/>
-          </a:p>
-          <a:p>
-            <a:pPr lvl="0">
-              <a:buNone/>
-            </a:pPr>
-            <a:r>
-              <a:rPr lang="en-US" sz="1200" dirty="0" smtClean="0"/>
-              <a:t>After performing 3 t-tests, we found that each sampling distribution was significantly different than the other 2, with the difference between Belgium and German beers being the greatest, and Belgian beers being rated higher than both </a:t>
-            </a:r>
-            <a:r>
-              <a:rPr lang="en-US" sz="1200" dirty="0" smtClean="0"/>
-              <a:t>US and </a:t>
-            </a:r>
-            <a:r>
-              <a:rPr lang="en-US" sz="1200" dirty="0" smtClean="0"/>
-              <a:t>German-style beers.</a:t>
+              <a:t>After performing 3 t-tests, we found that each sampling distribution was significantly different than the other 2, with the difference between Belgium and German beers being the greatest, and Belgian beers being rated higher than both US and German-style beers.</a:t>
             </a:r>
             <a:endParaRPr lang="en" sz="1400" dirty="0"/>
           </a:p>
@@ -10523,15 +10391,7 @@
             </a:pPr>
             <a:r>
               <a:rPr lang="en-US" sz="1050" dirty="0" smtClean="0"/>
-              <a:t>Froe the time series plot of average </a:t>
-            </a:r>
-            <a:r>
-              <a:rPr lang="en-US" sz="1050" dirty="0" smtClean="0"/>
-              <a:t>US </a:t>
-            </a:r>
-            <a:r>
-              <a:rPr lang="en-US" sz="1050" dirty="0" smtClean="0"/>
-              <a:t>overall </a:t>
+              <a:t>Froe the time series plot of average US overall </a:t>
             </a:r>
             <a:r>
               <a:rPr lang="en-US" sz="1050" dirty="0"/>

</xml_diff>